<commit_message>
Incorporated Feedback from Initial Presentation
</commit_message>
<xml_diff>
--- a/Presentation.pptx
+++ b/Presentation.pptx
@@ -13,6 +13,7 @@
     <p:sldId id="259" r:id="rId7"/>
     <p:sldId id="260" r:id="rId8"/>
     <p:sldId id="261" r:id="rId9"/>
+    <p:sldId id="264" r:id="rId10"/>
   </p:sldIdLst>
   <p:sldSz cx="12192000" cy="6858000"/>
   <p:notesSz cx="6858000" cy="9144000"/>
@@ -3441,29 +3442,44 @@
           <a:p>
             <a:r>
               <a:rPr lang="en-US" dirty="0"/>
-              <a:t>As the world recovers from Covid-19, it’s important to determine an effective vaccination strategy to prepare for the next pandemic.</a:t>
-            </a:r>
+              <a:t>The Covid– 19 pandemic exposed the ineffectiveness of vaccination policies.</a:t>
+            </a:r>
+          </a:p>
+          <a:p>
+            <a:pPr marL="0" indent="0">
+              <a:buNone/>
+            </a:pPr>
+            <a:endParaRPr lang="en-US" dirty="0"/>
           </a:p>
           <a:p>
             <a:r>
               <a:rPr lang="en-US" dirty="0"/>
-              <a:t>With limited resources it’s important to have an efficient strategy to vaccinate those who need it.</a:t>
-            </a:r>
+              <a:t>Vaccinations are effective in preventing deaths or adverse effects of viruses.</a:t>
+            </a:r>
+          </a:p>
+          <a:p>
+            <a:pPr marL="0" indent="0">
+              <a:buNone/>
+            </a:pPr>
+            <a:endParaRPr lang="en-US" dirty="0"/>
           </a:p>
           <a:p>
             <a:r>
               <a:rPr lang="en-US" dirty="0"/>
-              <a:t>We analyzed a dataset containing information on the seasonal flu to predict whether a patient should get a vaccination.</a:t>
-            </a:r>
+              <a:t>Reviewed data on the seasonal flu to predict whether a patient should get a vaccination.</a:t>
+            </a:r>
+          </a:p>
+          <a:p>
+            <a:pPr marL="0" indent="0">
+              <a:buNone/>
+            </a:pPr>
+            <a:endParaRPr lang="en-US" dirty="0"/>
           </a:p>
           <a:p>
             <a:r>
               <a:rPr lang="en-US" dirty="0"/>
-              <a:t>We created a model aimed to reduce the number of false negatives, finding </a:t>
-            </a:r>
-          </a:p>
-          <a:p>
-            <a:endParaRPr lang="en-US" dirty="0"/>
+              <a:t>Created a model aimed to identify as many people who require vaccination.</a:t>
+            </a:r>
           </a:p>
         </p:txBody>
       </p:sp>
@@ -3519,10 +3535,9 @@
           <a:lstStyle/>
           <a:p>
             <a:r>
-              <a:rPr lang="en-US" dirty="0" err="1"/>
-              <a:t>DataSet</a:t>
-            </a:r>
-            <a:endParaRPr lang="en-US" dirty="0"/>
+              <a:rPr lang="en-US" dirty="0"/>
+              <a:t>Data</a:t>
+            </a:r>
           </a:p>
         </p:txBody>
       </p:sp>
@@ -3542,9 +3557,16 @@
             <p:ph idx="1"/>
           </p:nvPr>
         </p:nvSpPr>
-        <p:spPr/>
-        <p:txBody>
-          <a:bodyPr/>
+        <p:spPr>
+          <a:xfrm>
+            <a:off x="2231136" y="2638044"/>
+            <a:ext cx="7729728" cy="3643486"/>
+          </a:xfrm>
+        </p:spPr>
+        <p:txBody>
+          <a:bodyPr>
+            <a:normAutofit/>
+          </a:bodyPr>
           <a:lstStyle/>
           <a:p>
             <a:r>
@@ -3553,16 +3575,34 @@
             </a:r>
           </a:p>
           <a:p>
+            <a:pPr marL="0" indent="0">
+              <a:buNone/>
+            </a:pPr>
+            <a:endParaRPr lang="en-US" dirty="0"/>
+          </a:p>
+          <a:p>
             <a:r>
               <a:rPr lang="en-US" dirty="0"/>
               <a:t>In this study, we will only be focused on the features and predicting vaccination for the seasonal flu.</a:t>
             </a:r>
           </a:p>
           <a:p>
+            <a:pPr marL="0" indent="0">
+              <a:buNone/>
+            </a:pPr>
+            <a:endParaRPr lang="en-US" dirty="0"/>
+          </a:p>
+          <a:p>
             <a:r>
               <a:rPr lang="en-US" dirty="0"/>
               <a:t>The training data for the model contains around 26 thousands records and 35 data features.</a:t>
             </a:r>
+          </a:p>
+          <a:p>
+            <a:pPr marL="0" indent="0">
+              <a:buNone/>
+            </a:pPr>
+            <a:endParaRPr lang="en-US" dirty="0"/>
           </a:p>
           <a:p>
             <a:r>
@@ -3652,10 +3692,10 @@
         </p:nvGrpSpPr>
         <p:grpSpPr>
           <a:xfrm>
-            <a:off x="1985963" y="1312207"/>
-            <a:ext cx="6972299" cy="5131816"/>
-            <a:chOff x="1985963" y="1312207"/>
-            <a:chExt cx="6972299" cy="5131816"/>
+            <a:off x="2862470" y="2466764"/>
+            <a:ext cx="5784956" cy="3788263"/>
+            <a:chOff x="1985963" y="699161"/>
+            <a:chExt cx="7229475" cy="5646106"/>
           </a:xfrm>
         </p:grpSpPr>
         <p:pic>
@@ -3679,8 +3719,8 @@
           </p:blipFill>
           <p:spPr>
             <a:xfrm>
-              <a:off x="3771899" y="1710995"/>
-              <a:ext cx="5186363" cy="4733028"/>
+              <a:off x="4029075" y="1612238"/>
+              <a:ext cx="5186363" cy="4733029"/>
             </a:xfrm>
             <a:prstGeom prst="rect">
               <a:avLst/>
@@ -3841,8 +3881,8 @@
           </p:nvSpPr>
           <p:spPr>
             <a:xfrm>
-              <a:off x="3771899" y="1312207"/>
-              <a:ext cx="4862512" cy="369332"/>
+              <a:off x="3771899" y="699161"/>
+              <a:ext cx="4862511" cy="369332"/>
             </a:xfrm>
             <a:prstGeom prst="rect">
               <a:avLst/>
@@ -3863,6 +3903,45 @@
           </p:txBody>
         </p:sp>
       </p:grpSp>
+      <p:sp>
+        <p:nvSpPr>
+          <p:cNvPr id="15" name="TextBox 14">
+            <a:extLst>
+              <a:ext uri="{FF2B5EF4-FFF2-40B4-BE49-F238E27FC236}">
+                <a16:creationId xmlns:a16="http://schemas.microsoft.com/office/drawing/2014/main" id="{A8F83C8C-EC97-126A-10ED-2820F7D353C3}"/>
+              </a:ext>
+            </a:extLst>
+          </p:cNvPr>
+          <p:cNvSpPr txBox="1"/>
+          <p:nvPr/>
+        </p:nvSpPr>
+        <p:spPr>
+          <a:xfrm>
+            <a:off x="1401517" y="1417983"/>
+            <a:ext cx="9603275" cy="369332"/>
+          </a:xfrm>
+          <a:prstGeom prst="rect">
+            <a:avLst/>
+          </a:prstGeom>
+          <a:noFill/>
+        </p:spPr>
+        <p:txBody>
+          <a:bodyPr wrap="square" rtlCol="0">
+            <a:spAutoFit/>
+          </a:bodyPr>
+          <a:lstStyle/>
+          <a:p>
+            <a:pPr marL="285750" indent="-285750">
+              <a:buFont typeface="Arial" panose="020B0604020202020204" pitchFamily="34" charset="0"/>
+              <a:buChar char="•"/>
+            </a:pPr>
+            <a:r>
+              <a:rPr lang="en-US" dirty="0"/>
+              <a:t>Higher education generally correlates with higher vaccination rates.</a:t>
+            </a:r>
+          </a:p>
+        </p:txBody>
+      </p:sp>
     </p:spTree>
     <p:extLst>
       <p:ext uri="{BB962C8B-B14F-4D97-AF65-F5344CB8AC3E}">
@@ -3949,8 +4028,8 @@
         </p:blipFill>
         <p:spPr>
           <a:xfrm>
-            <a:off x="4114800" y="1872022"/>
-            <a:ext cx="4571999" cy="4572001"/>
+            <a:off x="4600572" y="2738978"/>
+            <a:ext cx="3816839" cy="3816841"/>
           </a:xfrm>
           <a:prstGeom prst="rect">
             <a:avLst/>
@@ -3971,7 +4050,7 @@
         </p:nvSpPr>
         <p:spPr>
           <a:xfrm>
-            <a:off x="4257673" y="6453143"/>
+            <a:off x="4452724" y="6488668"/>
             <a:ext cx="2143126" cy="369332"/>
           </a:xfrm>
           <a:prstGeom prst="rect">
@@ -4006,7 +4085,7 @@
         </p:nvSpPr>
         <p:spPr>
           <a:xfrm>
-            <a:off x="6886573" y="6444023"/>
+            <a:off x="7000871" y="6516910"/>
             <a:ext cx="2143126" cy="369332"/>
           </a:xfrm>
           <a:prstGeom prst="rect">
@@ -4041,7 +4120,7 @@
         </p:nvSpPr>
         <p:spPr>
           <a:xfrm>
-            <a:off x="3586163" y="6186488"/>
+            <a:off x="4124743" y="6304002"/>
             <a:ext cx="414337" cy="369332"/>
           </a:xfrm>
           <a:prstGeom prst="rect">
@@ -4076,7 +4155,7 @@
         </p:nvSpPr>
         <p:spPr>
           <a:xfrm>
-            <a:off x="3586163" y="5447824"/>
+            <a:off x="4010443" y="5628604"/>
             <a:ext cx="528637" cy="369332"/>
           </a:xfrm>
           <a:prstGeom prst="rect">
@@ -4111,7 +4190,7 @@
         </p:nvSpPr>
         <p:spPr>
           <a:xfrm>
-            <a:off x="3606049" y="4636291"/>
+            <a:off x="4041189" y="4907903"/>
             <a:ext cx="528637" cy="369332"/>
           </a:xfrm>
           <a:prstGeom prst="rect">
@@ -4146,7 +4225,7 @@
         </p:nvSpPr>
         <p:spPr>
           <a:xfrm>
-            <a:off x="3596106" y="3754692"/>
+            <a:off x="4041188" y="4292340"/>
             <a:ext cx="528637" cy="369332"/>
           </a:xfrm>
           <a:prstGeom prst="rect">
@@ -4181,7 +4260,7 @@
         </p:nvSpPr>
         <p:spPr>
           <a:xfrm>
-            <a:off x="3586162" y="2943159"/>
+            <a:off x="4010441" y="3461215"/>
             <a:ext cx="528637" cy="369332"/>
           </a:xfrm>
           <a:prstGeom prst="rect">
@@ -4216,7 +4295,7 @@
         </p:nvSpPr>
         <p:spPr>
           <a:xfrm>
-            <a:off x="3580627" y="2069721"/>
+            <a:off x="4010441" y="2601151"/>
             <a:ext cx="528637" cy="369332"/>
           </a:xfrm>
           <a:prstGeom prst="rect">
@@ -4233,6 +4312,45 @@
             <a:r>
               <a:rPr lang="en-US" dirty="0"/>
               <a:t>0.5</a:t>
+            </a:r>
+          </a:p>
+        </p:txBody>
+      </p:sp>
+      <p:sp>
+        <p:nvSpPr>
+          <p:cNvPr id="18" name="TextBox 17">
+            <a:extLst>
+              <a:ext uri="{FF2B5EF4-FFF2-40B4-BE49-F238E27FC236}">
+                <a16:creationId xmlns:a16="http://schemas.microsoft.com/office/drawing/2014/main" id="{BCCDAF72-C098-2228-B12E-619226827A6E}"/>
+              </a:ext>
+            </a:extLst>
+          </p:cNvPr>
+          <p:cNvSpPr txBox="1"/>
+          <p:nvPr/>
+        </p:nvSpPr>
+        <p:spPr>
+          <a:xfrm>
+            <a:off x="1550504" y="1736035"/>
+            <a:ext cx="9504350" cy="369332"/>
+          </a:xfrm>
+          <a:prstGeom prst="rect">
+            <a:avLst/>
+          </a:prstGeom>
+          <a:noFill/>
+        </p:spPr>
+        <p:txBody>
+          <a:bodyPr wrap="square" rtlCol="0">
+            <a:spAutoFit/>
+          </a:bodyPr>
+          <a:lstStyle/>
+          <a:p>
+            <a:pPr marL="285750" indent="-285750">
+              <a:buFont typeface="Arial" panose="020B0604020202020204" pitchFamily="34" charset="0"/>
+              <a:buChar char="•"/>
+            </a:pPr>
+            <a:r>
+              <a:rPr lang="en-US" dirty="0"/>
+              <a:t>People who got a doctor’s recommendation are almost 3 times as likely to take a vaccine.</a:t>
             </a:r>
           </a:p>
         </p:txBody>
@@ -5114,6 +5232,148 @@
     <p:extLst>
       <p:ext uri="{BB962C8B-B14F-4D97-AF65-F5344CB8AC3E}">
         <p14:creationId xmlns:p14="http://schemas.microsoft.com/office/powerpoint/2010/main" val="1049255770"/>
+      </p:ext>
+    </p:extLst>
+  </p:cSld>
+  <p:clrMapOvr>
+    <a:masterClrMapping/>
+  </p:clrMapOvr>
+</p:sld>
+</file>
+
+<file path=ppt/slides/slide9.xml><?xml version="1.0" encoding="utf-8"?>
+<p:sld xmlns:a="http://schemas.openxmlformats.org/drawingml/2006/main" xmlns:r="http://schemas.openxmlformats.org/officeDocument/2006/relationships" xmlns:p="http://schemas.openxmlformats.org/presentationml/2006/main">
+  <p:cSld>
+    <p:spTree>
+      <p:nvGrpSpPr>
+        <p:cNvPr id="1" name=""/>
+        <p:cNvGrpSpPr/>
+        <p:nvPr/>
+      </p:nvGrpSpPr>
+      <p:grpSpPr>
+        <a:xfrm>
+          <a:off x="0" y="0"/>
+          <a:ext cx="0" cy="0"/>
+          <a:chOff x="0" y="0"/>
+          <a:chExt cx="0" cy="0"/>
+        </a:xfrm>
+      </p:grpSpPr>
+      <p:sp>
+        <p:nvSpPr>
+          <p:cNvPr id="2" name="Title 1">
+            <a:extLst>
+              <a:ext uri="{FF2B5EF4-FFF2-40B4-BE49-F238E27FC236}">
+                <a16:creationId xmlns:a16="http://schemas.microsoft.com/office/drawing/2014/main" id="{8ED2E1A2-FDDB-D893-A480-46AE4E4FD86E}"/>
+              </a:ext>
+            </a:extLst>
+          </p:cNvPr>
+          <p:cNvSpPr>
+            <a:spLocks noGrp="1"/>
+          </p:cNvSpPr>
+          <p:nvPr>
+            <p:ph type="title"/>
+          </p:nvPr>
+        </p:nvSpPr>
+        <p:spPr/>
+        <p:txBody>
+          <a:bodyPr/>
+          <a:lstStyle/>
+          <a:p>
+            <a:r>
+              <a:rPr lang="en-US" dirty="0"/>
+              <a:t>Contact Information</a:t>
+            </a:r>
+          </a:p>
+        </p:txBody>
+      </p:sp>
+      <p:sp>
+        <p:nvSpPr>
+          <p:cNvPr id="3" name="Content Placeholder 2">
+            <a:extLst>
+              <a:ext uri="{FF2B5EF4-FFF2-40B4-BE49-F238E27FC236}">
+                <a16:creationId xmlns:a16="http://schemas.microsoft.com/office/drawing/2014/main" id="{5A6FC140-D78F-F615-1845-B3DA8A9E1E7D}"/>
+              </a:ext>
+            </a:extLst>
+          </p:cNvPr>
+          <p:cNvSpPr>
+            <a:spLocks noGrp="1"/>
+          </p:cNvSpPr>
+          <p:nvPr>
+            <p:ph idx="1"/>
+          </p:nvPr>
+        </p:nvSpPr>
+        <p:spPr/>
+        <p:txBody>
+          <a:bodyPr/>
+          <a:lstStyle/>
+          <a:p>
+            <a:r>
+              <a:rPr lang="en-US" dirty="0"/>
+              <a:t>Email: </a:t>
+            </a:r>
+            <a:r>
+              <a:rPr lang="en-US" dirty="0">
+                <a:hlinkClick r:id="rId2"/>
+              </a:rPr>
+              <a:t>Dhruvragunathan@gmail.com</a:t>
+            </a:r>
+            <a:r>
+              <a:rPr lang="en-US" dirty="0"/>
+              <a:t>	</a:t>
+            </a:r>
+          </a:p>
+          <a:p>
+            <a:r>
+              <a:rPr lang="en-US" dirty="0"/>
+              <a:t>LinkedIn: </a:t>
+            </a:r>
+            <a:r>
+              <a:rPr lang="en-US" dirty="0">
+                <a:hlinkClick r:id="rId3"/>
+              </a:rPr>
+              <a:t>https://www.linkedin.com/in/dhruv-ragunathan-908993b1/</a:t>
+            </a:r>
+            <a:r>
+              <a:rPr lang="en-US" dirty="0"/>
+              <a:t> </a:t>
+            </a:r>
+          </a:p>
+          <a:p>
+            <a:r>
+              <a:rPr lang="en-US" dirty="0" err="1"/>
+              <a:t>Github</a:t>
+            </a:r>
+            <a:r>
+              <a:rPr lang="en-US" dirty="0"/>
+              <a:t>: </a:t>
+            </a:r>
+            <a:r>
+              <a:rPr lang="en-US" dirty="0">
+                <a:hlinkClick r:id="rId4"/>
+              </a:rPr>
+              <a:t>https://github.com</a:t>
+            </a:r>
+            <a:r>
+              <a:rPr lang="en-US">
+                <a:hlinkClick r:id="rId4"/>
+              </a:rPr>
+              <a:t>/dragunat2016/CDCH1N1</a:t>
+            </a:r>
+            <a:r>
+              <a:rPr lang="en-US"/>
+              <a:t> </a:t>
+            </a:r>
+            <a:endParaRPr lang="en-US" dirty="0"/>
+          </a:p>
+          <a:p>
+            <a:endParaRPr lang="en-US" dirty="0"/>
+          </a:p>
+        </p:txBody>
+      </p:sp>
+    </p:spTree>
+    <p:extLst>
+      <p:ext uri="{BB962C8B-B14F-4D97-AF65-F5344CB8AC3E}">
+        <p14:creationId xmlns:p14="http://schemas.microsoft.com/office/powerpoint/2010/main" val="86364214"/>
       </p:ext>
     </p:extLst>
   </p:cSld>

</xml_diff>